<commit_message>
Updated catalog page in wireframes_2.1.pptx
</commit_message>
<xml_diff>
--- a/docs/wireframes/wireframes_2.1.pptx
+++ b/docs/wireframes/wireframes_2.1.pptx
@@ -271,7 +271,7 @@
           <a:p>
             <a:fld id="{E739BB41-DB51-AC40-8BC3-82550C14AA6F}" type="datetimeFigureOut">
               <a:rPr lang="en-US" smtClean="0"/>
-              <a:t>4/15/19</a:t>
+              <a:t>4/25/19</a:t>
             </a:fld>
             <a:endParaRPr lang="en-US"/>
           </a:p>
@@ -441,7 +441,7 @@
           <a:p>
             <a:fld id="{E739BB41-DB51-AC40-8BC3-82550C14AA6F}" type="datetimeFigureOut">
               <a:rPr lang="en-US" smtClean="0"/>
-              <a:t>4/15/19</a:t>
+              <a:t>4/25/19</a:t>
             </a:fld>
             <a:endParaRPr lang="en-US"/>
           </a:p>
@@ -621,7 +621,7 @@
           <a:p>
             <a:fld id="{E739BB41-DB51-AC40-8BC3-82550C14AA6F}" type="datetimeFigureOut">
               <a:rPr lang="en-US" smtClean="0"/>
-              <a:t>4/15/19</a:t>
+              <a:t>4/25/19</a:t>
             </a:fld>
             <a:endParaRPr lang="en-US"/>
           </a:p>
@@ -791,7 +791,7 @@
           <a:p>
             <a:fld id="{E739BB41-DB51-AC40-8BC3-82550C14AA6F}" type="datetimeFigureOut">
               <a:rPr lang="en-US" smtClean="0"/>
-              <a:t>4/15/19</a:t>
+              <a:t>4/25/19</a:t>
             </a:fld>
             <a:endParaRPr lang="en-US"/>
           </a:p>
@@ -1037,7 +1037,7 @@
           <a:p>
             <a:fld id="{E739BB41-DB51-AC40-8BC3-82550C14AA6F}" type="datetimeFigureOut">
               <a:rPr lang="en-US" smtClean="0"/>
-              <a:t>4/15/19</a:t>
+              <a:t>4/25/19</a:t>
             </a:fld>
             <a:endParaRPr lang="en-US"/>
           </a:p>
@@ -1269,7 +1269,7 @@
           <a:p>
             <a:fld id="{E739BB41-DB51-AC40-8BC3-82550C14AA6F}" type="datetimeFigureOut">
               <a:rPr lang="en-US" smtClean="0"/>
-              <a:t>4/15/19</a:t>
+              <a:t>4/25/19</a:t>
             </a:fld>
             <a:endParaRPr lang="en-US"/>
           </a:p>
@@ -1636,7 +1636,7 @@
           <a:p>
             <a:fld id="{E739BB41-DB51-AC40-8BC3-82550C14AA6F}" type="datetimeFigureOut">
               <a:rPr lang="en-US" smtClean="0"/>
-              <a:t>4/15/19</a:t>
+              <a:t>4/25/19</a:t>
             </a:fld>
             <a:endParaRPr lang="en-US"/>
           </a:p>
@@ -1754,7 +1754,7 @@
           <a:p>
             <a:fld id="{E739BB41-DB51-AC40-8BC3-82550C14AA6F}" type="datetimeFigureOut">
               <a:rPr lang="en-US" smtClean="0"/>
-              <a:t>4/15/19</a:t>
+              <a:t>4/25/19</a:t>
             </a:fld>
             <a:endParaRPr lang="en-US"/>
           </a:p>
@@ -1849,7 +1849,7 @@
           <a:p>
             <a:fld id="{E739BB41-DB51-AC40-8BC3-82550C14AA6F}" type="datetimeFigureOut">
               <a:rPr lang="en-US" smtClean="0"/>
-              <a:t>4/15/19</a:t>
+              <a:t>4/25/19</a:t>
             </a:fld>
             <a:endParaRPr lang="en-US"/>
           </a:p>
@@ -2126,7 +2126,7 @@
           <a:p>
             <a:fld id="{E739BB41-DB51-AC40-8BC3-82550C14AA6F}" type="datetimeFigureOut">
               <a:rPr lang="en-US" smtClean="0"/>
-              <a:t>4/15/19</a:t>
+              <a:t>4/25/19</a:t>
             </a:fld>
             <a:endParaRPr lang="en-US"/>
           </a:p>
@@ -2383,7 +2383,7 @@
           <a:p>
             <a:fld id="{E739BB41-DB51-AC40-8BC3-82550C14AA6F}" type="datetimeFigureOut">
               <a:rPr lang="en-US" smtClean="0"/>
-              <a:t>4/15/19</a:t>
+              <a:t>4/25/19</a:t>
             </a:fld>
             <a:endParaRPr lang="en-US"/>
           </a:p>
@@ -2729,7 +2729,7 @@
           <a:p>
             <a:fld id="{E739BB41-DB51-AC40-8BC3-82550C14AA6F}" type="datetimeFigureOut">
               <a:rPr lang="en-US" smtClean="0"/>
-              <a:t>4/15/19</a:t>
+              <a:t>4/25/19</a:t>
             </a:fld>
             <a:endParaRPr lang="en-US"/>
           </a:p>
@@ -6681,12 +6681,20 @@
           <a:p>
             <a:pPr algn="ctr"/>
             <a:r>
+              <a:rPr lang="en-US">
+                <a:solidFill>
+                  <a:schemeClr val="bg1"/>
+                </a:solidFill>
+              </a:rPr>
+              <a:t>This is </a:t>
+            </a:r>
+            <a:r>
               <a:rPr lang="en-US" dirty="0">
                 <a:solidFill>
                   <a:schemeClr val="bg1"/>
                 </a:solidFill>
               </a:rPr>
-              <a:t>This will be used during transactions between users</a:t>
+              <a:t>used during transactions between users</a:t>
             </a:r>
           </a:p>
         </p:txBody>
@@ -19613,7 +19621,7 @@
         <p:spPr>
           <a:xfrm>
             <a:off x="3500787" y="1459039"/>
-            <a:ext cx="1903617" cy="2462213"/>
+            <a:ext cx="1903617" cy="2677656"/>
           </a:xfrm>
           <a:prstGeom prst="rect">
             <a:avLst/>
@@ -19630,6 +19638,15 @@
             <a:spAutoFit/>
           </a:bodyPr>
           <a:lstStyle/>
+          <a:p>
+            <a:pPr algn="l"/>
+            <a:endParaRPr lang="en-US" sz="1400" dirty="0">
+              <a:solidFill>
+                <a:schemeClr val="bg1"/>
+              </a:solidFill>
+              <a:latin typeface="Comic Sans MS" panose="030F0902030302020204" pitchFamily="66" charset="0"/>
+            </a:endParaRPr>
+          </a:p>
           <a:p>
             <a:pPr algn="l"/>
             <a:endParaRPr lang="en-US" sz="1400" dirty="0">
@@ -19877,7 +19894,7 @@
         <p:spPr>
           <a:xfrm>
             <a:off x="5904929" y="1445529"/>
-            <a:ext cx="1903617" cy="2462213"/>
+            <a:ext cx="1903617" cy="2677656"/>
           </a:xfrm>
           <a:prstGeom prst="rect">
             <a:avLst/>
@@ -19993,6 +20010,15 @@
               <a:latin typeface="Comic Sans MS" panose="030F0902030302020204" pitchFamily="66" charset="0"/>
             </a:endParaRPr>
           </a:p>
+          <a:p>
+            <a:pPr algn="l"/>
+            <a:endParaRPr lang="en-US" sz="1400" dirty="0">
+              <a:solidFill>
+                <a:schemeClr val="bg1"/>
+              </a:solidFill>
+              <a:latin typeface="Comic Sans MS" panose="030F0902030302020204" pitchFamily="66" charset="0"/>
+            </a:endParaRPr>
+          </a:p>
         </p:txBody>
       </p:sp>
       <p:sp>
@@ -20010,7 +20036,7 @@
         <p:spPr>
           <a:xfrm>
             <a:off x="8341380" y="1459039"/>
-            <a:ext cx="1903617" cy="2462213"/>
+            <a:ext cx="1903617" cy="2677656"/>
           </a:xfrm>
           <a:prstGeom prst="rect">
             <a:avLst/>
@@ -20027,6 +20053,15 @@
             <a:spAutoFit/>
           </a:bodyPr>
           <a:lstStyle/>
+          <a:p>
+            <a:pPr algn="l"/>
+            <a:endParaRPr lang="en-US" sz="1400" dirty="0">
+              <a:solidFill>
+                <a:schemeClr val="bg1"/>
+              </a:solidFill>
+              <a:latin typeface="Comic Sans MS" panose="030F0902030302020204" pitchFamily="66" charset="0"/>
+            </a:endParaRPr>
+          </a:p>
           <a:p>
             <a:pPr algn="l"/>
             <a:endParaRPr lang="en-US" sz="1400" dirty="0">
@@ -20740,6 +20775,126 @@
                 <a:latin typeface="Comic Sans MS" panose="030F0902030302020204" pitchFamily="66" charset="0"/>
               </a:rPr>
               <a:t>Post New Item</a:t>
+            </a:r>
+          </a:p>
+        </p:txBody>
+      </p:sp>
+      <p:sp>
+        <p:nvSpPr>
+          <p:cNvPr id="6" name="TextBox 5">
+            <a:extLst>
+              <a:ext uri="{FF2B5EF4-FFF2-40B4-BE49-F238E27FC236}">
+                <a16:creationId xmlns:a16="http://schemas.microsoft.com/office/drawing/2014/main" id="{268261D5-C4B3-D14D-84EC-D38BC38BABA0}"/>
+              </a:ext>
+            </a:extLst>
+          </p:cNvPr>
+          <p:cNvSpPr txBox="1"/>
+          <p:nvPr/>
+        </p:nvSpPr>
+        <p:spPr>
+          <a:xfrm>
+            <a:off x="3593213" y="3805836"/>
+            <a:ext cx="1686456" cy="307777"/>
+          </a:xfrm>
+          <a:prstGeom prst="rect">
+            <a:avLst/>
+          </a:prstGeom>
+          <a:solidFill>
+            <a:schemeClr val="accent6"/>
+          </a:solidFill>
+        </p:spPr>
+        <p:txBody>
+          <a:bodyPr wrap="square" rtlCol="0">
+            <a:spAutoFit/>
+          </a:bodyPr>
+          <a:lstStyle/>
+          <a:p>
+            <a:pPr algn="l"/>
+            <a:r>
+              <a:rPr lang="en-US" sz="1400" dirty="0">
+                <a:latin typeface="Comic Sans MS" panose="030F0902030302020204" pitchFamily="66" charset="0"/>
+              </a:rPr>
+              <a:t>Status: Available</a:t>
+            </a:r>
+          </a:p>
+        </p:txBody>
+      </p:sp>
+      <p:sp>
+        <p:nvSpPr>
+          <p:cNvPr id="39" name="TextBox 38">
+            <a:extLst>
+              <a:ext uri="{FF2B5EF4-FFF2-40B4-BE49-F238E27FC236}">
+                <a16:creationId xmlns:a16="http://schemas.microsoft.com/office/drawing/2014/main" id="{400F834D-2DE9-594D-91A7-F3A5EBAA0DC8}"/>
+              </a:ext>
+            </a:extLst>
+          </p:cNvPr>
+          <p:cNvSpPr txBox="1"/>
+          <p:nvPr/>
+        </p:nvSpPr>
+        <p:spPr>
+          <a:xfrm>
+            <a:off x="8445690" y="3782754"/>
+            <a:ext cx="1686456" cy="307777"/>
+          </a:xfrm>
+          <a:prstGeom prst="rect">
+            <a:avLst/>
+          </a:prstGeom>
+          <a:solidFill>
+            <a:schemeClr val="accent6"/>
+          </a:solidFill>
+        </p:spPr>
+        <p:txBody>
+          <a:bodyPr wrap="square" rtlCol="0">
+            <a:spAutoFit/>
+          </a:bodyPr>
+          <a:lstStyle/>
+          <a:p>
+            <a:pPr algn="l"/>
+            <a:r>
+              <a:rPr lang="en-US" sz="1400" dirty="0">
+                <a:latin typeface="Comic Sans MS" panose="030F0902030302020204" pitchFamily="66" charset="0"/>
+              </a:rPr>
+              <a:t>Status: Available</a:t>
+            </a:r>
+          </a:p>
+        </p:txBody>
+      </p:sp>
+      <p:sp>
+        <p:nvSpPr>
+          <p:cNvPr id="40" name="TextBox 39">
+            <a:extLst>
+              <a:ext uri="{FF2B5EF4-FFF2-40B4-BE49-F238E27FC236}">
+                <a16:creationId xmlns:a16="http://schemas.microsoft.com/office/drawing/2014/main" id="{00800D78-ED87-774F-9305-80F6902455B1}"/>
+              </a:ext>
+            </a:extLst>
+          </p:cNvPr>
+          <p:cNvSpPr txBox="1"/>
+          <p:nvPr/>
+        </p:nvSpPr>
+        <p:spPr>
+          <a:xfrm>
+            <a:off x="6013509" y="3803989"/>
+            <a:ext cx="1686456" cy="307777"/>
+          </a:xfrm>
+          <a:prstGeom prst="rect">
+            <a:avLst/>
+          </a:prstGeom>
+          <a:solidFill>
+            <a:srgbClr val="FF0000"/>
+          </a:solidFill>
+        </p:spPr>
+        <p:txBody>
+          <a:bodyPr wrap="square" rtlCol="0">
+            <a:spAutoFit/>
+          </a:bodyPr>
+          <a:lstStyle/>
+          <a:p>
+            <a:pPr algn="ctr"/>
+            <a:r>
+              <a:rPr lang="en-US" sz="1400" dirty="0">
+                <a:latin typeface="Comic Sans MS" panose="030F0902030302020204" pitchFamily="66" charset="0"/>
+              </a:rPr>
+              <a:t>Status: Sold</a:t>
             </a:r>
           </a:p>
         </p:txBody>

</xml_diff>

<commit_message>
Added form validations to reviews
</commit_message>
<xml_diff>
--- a/docs/wireframes/wireframes_2.1.pptx
+++ b/docs/wireframes/wireframes_2.1.pptx
@@ -9879,7 +9879,7 @@
         <p:spPr>
           <a:xfrm>
             <a:off x="2233351" y="581403"/>
-            <a:ext cx="2715808" cy="276999"/>
+            <a:ext cx="3090911" cy="276999"/>
           </a:xfrm>
           <a:prstGeom prst="rect">
             <a:avLst/>
@@ -9899,7 +9899,7 @@
                 </a:solidFill>
                 <a:latin typeface="Comic Sans MS" panose="030F0902030302020204" pitchFamily="66" charset="0"/>
               </a:rPr>
-              <a:t>http://localhost:3000/</a:t>
+              <a:t>http://localhost:3000/users/</a:t>
             </a:r>
             <a:r>
               <a:rPr lang="en-US" sz="1200" dirty="0" err="1">
@@ -9908,17 +9908,14 @@
                 </a:solidFill>
                 <a:latin typeface="Comic Sans MS" panose="030F0902030302020204" pitchFamily="66" charset="0"/>
               </a:rPr>
-              <a:t>My_Profile</a:t>
-            </a:r>
-            <a:r>
-              <a:rPr lang="en-US" sz="1200" dirty="0">
-                <a:solidFill>
-                  <a:schemeClr val="bg1"/>
-                </a:solidFill>
-                <a:latin typeface="Comic Sans MS" panose="030F0902030302020204" pitchFamily="66" charset="0"/>
-              </a:rPr>
-              <a:t>/</a:t>
-            </a:r>
+              <a:t>my_profile</a:t>
+            </a:r>
+            <a:endParaRPr lang="en-US" sz="1200" dirty="0">
+              <a:solidFill>
+                <a:schemeClr val="bg1"/>
+              </a:solidFill>
+              <a:latin typeface="Comic Sans MS" panose="030F0902030302020204" pitchFamily="66" charset="0"/>
+            </a:endParaRPr>
           </a:p>
         </p:txBody>
       </p:sp>
@@ -10314,64 +10311,6 @@
                 <a:latin typeface="Comic Sans MS" panose="030F0902030302020204" pitchFamily="66" charset="0"/>
               </a:rPr>
               <a:t> - User Profile</a:t>
-            </a:r>
-          </a:p>
-        </p:txBody>
-      </p:sp>
-      <p:sp>
-        <p:nvSpPr>
-          <p:cNvPr id="8" name="TextBox 7">
-            <a:extLst>
-              <a:ext uri="{FF2B5EF4-FFF2-40B4-BE49-F238E27FC236}">
-                <a16:creationId xmlns:a16="http://schemas.microsoft.com/office/drawing/2014/main" id="{49DF0299-C639-944C-9F0E-91BE71AC7E52}"/>
-              </a:ext>
-            </a:extLst>
-          </p:cNvPr>
-          <p:cNvSpPr txBox="1"/>
-          <p:nvPr/>
-        </p:nvSpPr>
-        <p:spPr>
-          <a:xfrm>
-            <a:off x="2233351" y="581403"/>
-            <a:ext cx="2715808" cy="276999"/>
-          </a:xfrm>
-          <a:prstGeom prst="rect">
-            <a:avLst/>
-          </a:prstGeom>
-          <a:noFill/>
-        </p:spPr>
-        <p:txBody>
-          <a:bodyPr wrap="none" rtlCol="0">
-            <a:spAutoFit/>
-          </a:bodyPr>
-          <a:lstStyle/>
-          <a:p>
-            <a:r>
-              <a:rPr lang="en-US" sz="1200" dirty="0">
-                <a:solidFill>
-                  <a:schemeClr val="bg1"/>
-                </a:solidFill>
-                <a:latin typeface="Comic Sans MS" panose="030F0902030302020204" pitchFamily="66" charset="0"/>
-              </a:rPr>
-              <a:t>http://localhost:3000/</a:t>
-            </a:r>
-            <a:r>
-              <a:rPr lang="en-US" sz="1200" dirty="0" err="1">
-                <a:solidFill>
-                  <a:schemeClr val="bg1"/>
-                </a:solidFill>
-                <a:latin typeface="Comic Sans MS" panose="030F0902030302020204" pitchFamily="66" charset="0"/>
-              </a:rPr>
-              <a:t>My_Profile</a:t>
-            </a:r>
-            <a:r>
-              <a:rPr lang="en-US" sz="1200" dirty="0">
-                <a:solidFill>
-                  <a:schemeClr val="bg1"/>
-                </a:solidFill>
-                <a:latin typeface="Comic Sans MS" panose="030F0902030302020204" pitchFamily="66" charset="0"/>
-              </a:rPr>
-              <a:t>/</a:t>
             </a:r>
           </a:p>
         </p:txBody>
@@ -11044,6 +10983,61 @@
           </a:p>
         </p:txBody>
       </p:sp>
+      <p:sp>
+        <p:nvSpPr>
+          <p:cNvPr id="18" name="TextBox 17">
+            <a:extLst>
+              <a:ext uri="{FF2B5EF4-FFF2-40B4-BE49-F238E27FC236}">
+                <a16:creationId xmlns:a16="http://schemas.microsoft.com/office/drawing/2014/main" id="{F5E890E1-473A-554C-847E-F88E4D053B57}"/>
+              </a:ext>
+            </a:extLst>
+          </p:cNvPr>
+          <p:cNvSpPr txBox="1"/>
+          <p:nvPr/>
+        </p:nvSpPr>
+        <p:spPr>
+          <a:xfrm>
+            <a:off x="2125922" y="590276"/>
+            <a:ext cx="3090911" cy="276999"/>
+          </a:xfrm>
+          <a:prstGeom prst="rect">
+            <a:avLst/>
+          </a:prstGeom>
+          <a:noFill/>
+        </p:spPr>
+        <p:txBody>
+          <a:bodyPr wrap="none" rtlCol="0">
+            <a:spAutoFit/>
+          </a:bodyPr>
+          <a:lstStyle/>
+          <a:p>
+            <a:r>
+              <a:rPr lang="en-US" sz="1200" dirty="0">
+                <a:solidFill>
+                  <a:schemeClr val="bg1"/>
+                </a:solidFill>
+                <a:latin typeface="Comic Sans MS" panose="030F0902030302020204" pitchFamily="66" charset="0"/>
+              </a:rPr>
+              <a:t>http://localhost:3000/users/</a:t>
+            </a:r>
+            <a:r>
+              <a:rPr lang="en-US" sz="1200" dirty="0" err="1">
+                <a:solidFill>
+                  <a:schemeClr val="bg1"/>
+                </a:solidFill>
+                <a:latin typeface="Comic Sans MS" panose="030F0902030302020204" pitchFamily="66" charset="0"/>
+              </a:rPr>
+              <a:t>my_profile</a:t>
+            </a:r>
+            <a:endParaRPr lang="en-US" sz="1200" dirty="0">
+              <a:solidFill>
+                <a:schemeClr val="bg1"/>
+              </a:solidFill>
+              <a:latin typeface="Comic Sans MS" panose="030F0902030302020204" pitchFamily="66" charset="0"/>
+            </a:endParaRPr>
+          </a:p>
+        </p:txBody>
+      </p:sp>
     </p:spTree>
     <p:extLst>
       <p:ext uri="{BB962C8B-B14F-4D97-AF65-F5344CB8AC3E}">
@@ -11175,64 +11169,6 @@
               </a:solidFill>
               <a:latin typeface="Comic Sans MS" panose="030F0902030302020204" pitchFamily="66" charset="0"/>
             </a:endParaRPr>
-          </a:p>
-        </p:txBody>
-      </p:sp>
-      <p:sp>
-        <p:nvSpPr>
-          <p:cNvPr id="8" name="TextBox 7">
-            <a:extLst>
-              <a:ext uri="{FF2B5EF4-FFF2-40B4-BE49-F238E27FC236}">
-                <a16:creationId xmlns:a16="http://schemas.microsoft.com/office/drawing/2014/main" id="{49DF0299-C639-944C-9F0E-91BE71AC7E52}"/>
-              </a:ext>
-            </a:extLst>
-          </p:cNvPr>
-          <p:cNvSpPr txBox="1"/>
-          <p:nvPr/>
-        </p:nvSpPr>
-        <p:spPr>
-          <a:xfrm>
-            <a:off x="2233351" y="581403"/>
-            <a:ext cx="2715808" cy="276999"/>
-          </a:xfrm>
-          <a:prstGeom prst="rect">
-            <a:avLst/>
-          </a:prstGeom>
-          <a:noFill/>
-        </p:spPr>
-        <p:txBody>
-          <a:bodyPr wrap="none" rtlCol="0">
-            <a:spAutoFit/>
-          </a:bodyPr>
-          <a:lstStyle/>
-          <a:p>
-            <a:r>
-              <a:rPr lang="en-US" sz="1200" dirty="0">
-                <a:solidFill>
-                  <a:schemeClr val="bg1"/>
-                </a:solidFill>
-                <a:latin typeface="Comic Sans MS" panose="030F0902030302020204" pitchFamily="66" charset="0"/>
-              </a:rPr>
-              <a:t>http://localhost:3000/</a:t>
-            </a:r>
-            <a:r>
-              <a:rPr lang="en-US" sz="1200" dirty="0" err="1">
-                <a:solidFill>
-                  <a:schemeClr val="bg1"/>
-                </a:solidFill>
-                <a:latin typeface="Comic Sans MS" panose="030F0902030302020204" pitchFamily="66" charset="0"/>
-              </a:rPr>
-              <a:t>My_Profile</a:t>
-            </a:r>
-            <a:r>
-              <a:rPr lang="en-US" sz="1200" dirty="0">
-                <a:solidFill>
-                  <a:schemeClr val="bg1"/>
-                </a:solidFill>
-                <a:latin typeface="Comic Sans MS" panose="030F0902030302020204" pitchFamily="66" charset="0"/>
-              </a:rPr>
-              <a:t>/</a:t>
-            </a:r>
           </a:p>
         </p:txBody>
       </p:sp>
@@ -12645,6 +12581,61 @@
           </a:graphicData>
         </a:graphic>
       </p:graphicFrame>
+      <p:sp>
+        <p:nvSpPr>
+          <p:cNvPr id="20" name="TextBox 19">
+            <a:extLst>
+              <a:ext uri="{FF2B5EF4-FFF2-40B4-BE49-F238E27FC236}">
+                <a16:creationId xmlns:a16="http://schemas.microsoft.com/office/drawing/2014/main" id="{B22EF6DF-817D-E046-ACB1-8AC4E42D9C96}"/>
+              </a:ext>
+            </a:extLst>
+          </p:cNvPr>
+          <p:cNvSpPr txBox="1"/>
+          <p:nvPr/>
+        </p:nvSpPr>
+        <p:spPr>
+          <a:xfrm>
+            <a:off x="2101950" y="583505"/>
+            <a:ext cx="3090911" cy="276999"/>
+          </a:xfrm>
+          <a:prstGeom prst="rect">
+            <a:avLst/>
+          </a:prstGeom>
+          <a:noFill/>
+        </p:spPr>
+        <p:txBody>
+          <a:bodyPr wrap="none" rtlCol="0">
+            <a:spAutoFit/>
+          </a:bodyPr>
+          <a:lstStyle/>
+          <a:p>
+            <a:r>
+              <a:rPr lang="en-US" sz="1200" dirty="0">
+                <a:solidFill>
+                  <a:schemeClr val="bg1"/>
+                </a:solidFill>
+                <a:latin typeface="Comic Sans MS" panose="030F0902030302020204" pitchFamily="66" charset="0"/>
+              </a:rPr>
+              <a:t>http://localhost:3000/users/</a:t>
+            </a:r>
+            <a:r>
+              <a:rPr lang="en-US" sz="1200" dirty="0" err="1">
+                <a:solidFill>
+                  <a:schemeClr val="bg1"/>
+                </a:solidFill>
+                <a:latin typeface="Comic Sans MS" panose="030F0902030302020204" pitchFamily="66" charset="0"/>
+              </a:rPr>
+              <a:t>my_profile</a:t>
+            </a:r>
+            <a:endParaRPr lang="en-US" sz="1200" dirty="0">
+              <a:solidFill>
+                <a:schemeClr val="bg1"/>
+              </a:solidFill>
+              <a:latin typeface="Comic Sans MS" panose="030F0902030302020204" pitchFamily="66" charset="0"/>
+            </a:endParaRPr>
+          </a:p>
+        </p:txBody>
+      </p:sp>
     </p:spTree>
     <p:extLst>
       <p:ext uri="{BB962C8B-B14F-4D97-AF65-F5344CB8AC3E}">
@@ -17215,7 +17206,7 @@
         <p:spPr>
           <a:xfrm>
             <a:off x="2233351" y="581403"/>
-            <a:ext cx="2587568" cy="276999"/>
+            <a:ext cx="3411511" cy="276999"/>
           </a:xfrm>
           <a:prstGeom prst="rect">
             <a:avLst/>
@@ -17235,7 +17226,7 @@
                 </a:solidFill>
                 <a:latin typeface="Comic Sans MS" panose="030F0902030302020204" pitchFamily="66" charset="0"/>
               </a:rPr>
-              <a:t>http://localhost:3000/items/new</a:t>
+              <a:t>http://localhost:3000/users/#/reviews/new</a:t>
             </a:r>
           </a:p>
         </p:txBody>
@@ -17956,7 +17947,7 @@
         <p:spPr>
           <a:xfrm>
             <a:off x="2233351" y="581403"/>
-            <a:ext cx="2587568" cy="276999"/>
+            <a:ext cx="4007828" cy="276999"/>
           </a:xfrm>
           <a:prstGeom prst="rect">
             <a:avLst/>
@@ -17976,7 +17967,25 @@
                 </a:solidFill>
                 <a:latin typeface="Comic Sans MS" panose="030F0902030302020204" pitchFamily="66" charset="0"/>
               </a:rPr>
-              <a:t>http://localhost:3000/items/new</a:t>
+              <a:t>http://localhost:3000/reviews/</a:t>
+            </a:r>
+            <a:r>
+              <a:rPr lang="en-US" sz="1200" dirty="0" err="1">
+                <a:solidFill>
+                  <a:schemeClr val="bg1"/>
+                </a:solidFill>
+                <a:latin typeface="Comic Sans MS" panose="030F0902030302020204" pitchFamily="66" charset="0"/>
+              </a:rPr>
+              <a:t>view_reviews</a:t>
+            </a:r>
+            <a:r>
+              <a:rPr lang="en-US" sz="1200" dirty="0">
+                <a:solidFill>
+                  <a:schemeClr val="bg1"/>
+                </a:solidFill>
+                <a:latin typeface="Comic Sans MS" panose="030F0902030302020204" pitchFamily="66" charset="0"/>
+              </a:rPr>
+              <a:t>_#/edit</a:t>
             </a:r>
           </a:p>
         </p:txBody>

</xml_diff>